<commit_message>
Cambios en la parte de infraestructuras
</commit_message>
<xml_diff>
--- a/Accidentes_v2.pptx
+++ b/Accidentes_v2.pptx
@@ -248,7 +248,7 @@
           <a:p>
             <a:fld id="{B5905E93-9311-440B-B43F-6BAC93AA959B}" type="datetimeFigureOut">
               <a:rPr lang="es-ES" smtClean="0"/>
-              <a:t>14/11/2018</a:t>
+              <a:t>15/11/2018</a:t>
             </a:fld>
             <a:endParaRPr lang="es-ES"/>
           </a:p>
@@ -418,7 +418,7 @@
           <a:p>
             <a:fld id="{B5905E93-9311-440B-B43F-6BAC93AA959B}" type="datetimeFigureOut">
               <a:rPr lang="es-ES" smtClean="0"/>
-              <a:t>14/11/2018</a:t>
+              <a:t>15/11/2018</a:t>
             </a:fld>
             <a:endParaRPr lang="es-ES"/>
           </a:p>
@@ -598,7 +598,7 @@
           <a:p>
             <a:fld id="{B5905E93-9311-440B-B43F-6BAC93AA959B}" type="datetimeFigureOut">
               <a:rPr lang="es-ES" smtClean="0"/>
-              <a:t>14/11/2018</a:t>
+              <a:t>15/11/2018</a:t>
             </a:fld>
             <a:endParaRPr lang="es-ES"/>
           </a:p>
@@ -1870,7 +1870,7 @@
           <a:p>
             <a:fld id="{B5905E93-9311-440B-B43F-6BAC93AA959B}" type="datetimeFigureOut">
               <a:rPr lang="es-ES" smtClean="0"/>
-              <a:t>14/11/2018</a:t>
+              <a:t>15/11/2018</a:t>
             </a:fld>
             <a:endParaRPr lang="es-ES"/>
           </a:p>
@@ -2108,7 +2108,7 @@
           <a:p>
             <a:fld id="{B5905E93-9311-440B-B43F-6BAC93AA959B}" type="datetimeFigureOut">
               <a:rPr lang="es-ES" smtClean="0"/>
-              <a:t>14/11/2018</a:t>
+              <a:t>15/11/2018</a:t>
             </a:fld>
             <a:endParaRPr lang="es-ES"/>
           </a:p>
@@ -2384,7 +2384,7 @@
           <a:p>
             <a:fld id="{B5905E93-9311-440B-B43F-6BAC93AA959B}" type="datetimeFigureOut">
               <a:rPr lang="es-ES" smtClean="0"/>
-              <a:t>14/11/2018</a:t>
+              <a:t>15/11/2018</a:t>
             </a:fld>
             <a:endParaRPr lang="es-ES"/>
           </a:p>
@@ -3585,7 +3585,7 @@
           <a:p>
             <a:fld id="{B5905E93-9311-440B-B43F-6BAC93AA959B}" type="datetimeFigureOut">
               <a:rPr lang="es-ES" smtClean="0"/>
-              <a:t>14/11/2018</a:t>
+              <a:t>15/11/2018</a:t>
             </a:fld>
             <a:endParaRPr lang="es-ES"/>
           </a:p>
@@ -3975,7 +3975,7 @@
           <a:p>
             <a:fld id="{B5905E93-9311-440B-B43F-6BAC93AA959B}" type="datetimeFigureOut">
               <a:rPr lang="es-ES" smtClean="0"/>
-              <a:t>14/11/2018</a:t>
+              <a:t>15/11/2018</a:t>
             </a:fld>
             <a:endParaRPr lang="es-ES"/>
           </a:p>
@@ -4098,7 +4098,7 @@
           <a:p>
             <a:fld id="{B5905E93-9311-440B-B43F-6BAC93AA959B}" type="datetimeFigureOut">
               <a:rPr lang="es-ES" smtClean="0"/>
-              <a:t>14/11/2018</a:t>
+              <a:t>15/11/2018</a:t>
             </a:fld>
             <a:endParaRPr lang="es-ES"/>
           </a:p>
@@ -4193,7 +4193,7 @@
           <a:p>
             <a:fld id="{B5905E93-9311-440B-B43F-6BAC93AA959B}" type="datetimeFigureOut">
               <a:rPr lang="es-ES" smtClean="0"/>
-              <a:t>14/11/2018</a:t>
+              <a:t>15/11/2018</a:t>
             </a:fld>
             <a:endParaRPr lang="es-ES"/>
           </a:p>
@@ -4956,7 +4956,7 @@
           <a:p>
             <a:fld id="{B5905E93-9311-440B-B43F-6BAC93AA959B}" type="datetimeFigureOut">
               <a:rPr lang="es-ES" smtClean="0"/>
-              <a:t>14/11/2018</a:t>
+              <a:t>15/11/2018</a:t>
             </a:fld>
             <a:endParaRPr lang="es-ES"/>
           </a:p>
@@ -5185,7 +5185,7 @@
           <a:p>
             <a:fld id="{B5905E93-9311-440B-B43F-6BAC93AA959B}" type="datetimeFigureOut">
               <a:rPr lang="es-ES" smtClean="0"/>
-              <a:t>14/11/2018</a:t>
+              <a:t>15/11/2018</a:t>
             </a:fld>
             <a:endParaRPr lang="es-ES"/>
           </a:p>
@@ -5966,7 +5966,7 @@
           <a:p>
             <a:fld id="{B5905E93-9311-440B-B43F-6BAC93AA959B}" type="datetimeFigureOut">
               <a:rPr lang="es-ES" smtClean="0"/>
-              <a:t>14/11/2018</a:t>
+              <a:t>15/11/2018</a:t>
             </a:fld>
             <a:endParaRPr lang="es-ES"/>
           </a:p>
@@ -6146,7 +6146,7 @@
           <a:p>
             <a:fld id="{B5905E93-9311-440B-B43F-6BAC93AA959B}" type="datetimeFigureOut">
               <a:rPr lang="es-ES" smtClean="0"/>
-              <a:t>14/11/2018</a:t>
+              <a:t>15/11/2018</a:t>
             </a:fld>
             <a:endParaRPr lang="es-ES"/>
           </a:p>
@@ -6326,7 +6326,7 @@
           <a:p>
             <a:fld id="{B5905E93-9311-440B-B43F-6BAC93AA959B}" type="datetimeFigureOut">
               <a:rPr lang="es-ES" smtClean="0"/>
-              <a:t>14/11/2018</a:t>
+              <a:t>15/11/2018</a:t>
             </a:fld>
             <a:endParaRPr lang="es-ES"/>
           </a:p>
@@ -6572,7 +6572,7 @@
           <a:p>
             <a:fld id="{B5905E93-9311-440B-B43F-6BAC93AA959B}" type="datetimeFigureOut">
               <a:rPr lang="es-ES" smtClean="0"/>
-              <a:t>14/11/2018</a:t>
+              <a:t>15/11/2018</a:t>
             </a:fld>
             <a:endParaRPr lang="es-ES"/>
           </a:p>
@@ -6804,7 +6804,7 @@
           <a:p>
             <a:fld id="{B5905E93-9311-440B-B43F-6BAC93AA959B}" type="datetimeFigureOut">
               <a:rPr lang="es-ES" smtClean="0"/>
-              <a:t>14/11/2018</a:t>
+              <a:t>15/11/2018</a:t>
             </a:fld>
             <a:endParaRPr lang="es-ES"/>
           </a:p>
@@ -7176,7 +7176,7 @@
           <a:p>
             <a:fld id="{B5905E93-9311-440B-B43F-6BAC93AA959B}" type="datetimeFigureOut">
               <a:rPr lang="es-ES" smtClean="0"/>
-              <a:t>14/11/2018</a:t>
+              <a:t>15/11/2018</a:t>
             </a:fld>
             <a:endParaRPr lang="es-ES"/>
           </a:p>
@@ -7299,7 +7299,7 @@
           <a:p>
             <a:fld id="{B5905E93-9311-440B-B43F-6BAC93AA959B}" type="datetimeFigureOut">
               <a:rPr lang="es-ES" smtClean="0"/>
-              <a:t>14/11/2018</a:t>
+              <a:t>15/11/2018</a:t>
             </a:fld>
             <a:endParaRPr lang="es-ES"/>
           </a:p>
@@ -7394,7 +7394,7 @@
           <a:p>
             <a:fld id="{B5905E93-9311-440B-B43F-6BAC93AA959B}" type="datetimeFigureOut">
               <a:rPr lang="es-ES" smtClean="0"/>
-              <a:t>14/11/2018</a:t>
+              <a:t>15/11/2018</a:t>
             </a:fld>
             <a:endParaRPr lang="es-ES"/>
           </a:p>
@@ -7671,7 +7671,7 @@
           <a:p>
             <a:fld id="{B5905E93-9311-440B-B43F-6BAC93AA959B}" type="datetimeFigureOut">
               <a:rPr lang="es-ES" smtClean="0"/>
-              <a:t>14/11/2018</a:t>
+              <a:t>15/11/2018</a:t>
             </a:fld>
             <a:endParaRPr lang="es-ES"/>
           </a:p>
@@ -7929,7 +7929,7 @@
           <a:p>
             <a:fld id="{B5905E93-9311-440B-B43F-6BAC93AA959B}" type="datetimeFigureOut">
               <a:rPr lang="es-ES" smtClean="0"/>
-              <a:t>14/11/2018</a:t>
+              <a:t>15/11/2018</a:t>
             </a:fld>
             <a:endParaRPr lang="es-ES"/>
           </a:p>
@@ -8142,7 +8142,7 @@
           <a:p>
             <a:fld id="{B5905E93-9311-440B-B43F-6BAC93AA959B}" type="datetimeFigureOut">
               <a:rPr lang="es-ES" smtClean="0"/>
-              <a:t>14/11/2018</a:t>
+              <a:t>15/11/2018</a:t>
             </a:fld>
             <a:endParaRPr lang="es-ES"/>
           </a:p>
@@ -8691,7 +8691,7 @@
           <a:p>
             <a:fld id="{B5905E93-9311-440B-B43F-6BAC93AA959B}" type="datetimeFigureOut">
               <a:rPr lang="es-ES" smtClean="0"/>
-              <a:t>14/11/2018</a:t>
+              <a:t>15/11/2018</a:t>
             </a:fld>
             <a:endParaRPr lang="es-ES"/>
           </a:p>
@@ -12349,49 +12349,8 @@
         </p:blipFill>
         <p:spPr bwMode="auto">
           <a:xfrm>
-            <a:off x="1071053" y="1348085"/>
+            <a:off x="1182777" y="1638069"/>
             <a:ext cx="4806950" cy="1807413"/>
-          </a:xfrm>
-          <a:prstGeom prst="rect">
-            <a:avLst/>
-          </a:prstGeom>
-          <a:noFill/>
-          <a:extLst>
-            <a:ext uri="{909E8E84-426E-40DD-AFC4-6F175D3DCCD1}">
-              <a14:hiddenFill xmlns:a14="http://schemas.microsoft.com/office/drawing/2010/main">
-                <a:solidFill>
-                  <a:srgbClr val="FFFFFF"/>
-                </a:solidFill>
-              </a14:hiddenFill>
-            </a:ext>
-          </a:extLst>
-        </p:spPr>
-      </p:pic>
-      <p:pic>
-        <p:nvPicPr>
-          <p:cNvPr id="2060" name="Picture 12" descr="Resultado de imagen de hadoop png"/>
-          <p:cNvPicPr>
-            <a:picLocks noChangeAspect="1" noChangeArrowheads="1"/>
-          </p:cNvPicPr>
-          <p:nvPr/>
-        </p:nvPicPr>
-        <p:blipFill>
-          <a:blip r:embed="rId3">
-            <a:extLst>
-              <a:ext uri="{28A0092B-C50C-407E-A947-70E740481C1C}">
-                <a14:useLocalDpi xmlns:a14="http://schemas.microsoft.com/office/drawing/2010/main" val="0"/>
-              </a:ext>
-            </a:extLst>
-          </a:blip>
-          <a:srcRect/>
-          <a:stretch>
-            <a:fillRect/>
-          </a:stretch>
-        </p:blipFill>
-        <p:spPr bwMode="auto">
-          <a:xfrm>
-            <a:off x="6487064" y="1838369"/>
-            <a:ext cx="5089585" cy="1317129"/>
           </a:xfrm>
           <a:prstGeom prst="rect">
             <a:avLst/>
@@ -12417,7 +12376,7 @@
           <p:nvPr/>
         </p:nvPicPr>
         <p:blipFill>
-          <a:blip r:embed="rId4">
+          <a:blip r:embed="rId3">
             <a:extLst>
               <a:ext uri="{28A0092B-C50C-407E-A947-70E740481C1C}">
                 <a14:useLocalDpi xmlns:a14="http://schemas.microsoft.com/office/drawing/2010/main" val="0"/>
@@ -12430,7 +12389,7 @@
         </p:blipFill>
         <p:spPr>
           <a:xfrm>
-            <a:off x="3810959" y="3779683"/>
+            <a:off x="1182777" y="4019453"/>
             <a:ext cx="5893759" cy="2529212"/>
           </a:xfrm>
           <a:prstGeom prst="rect">
@@ -12438,6 +12397,180 @@
           </a:prstGeom>
         </p:spPr>
       </p:pic>
+      <p:pic>
+        <p:nvPicPr>
+          <p:cNvPr id="1026" name="Picture 2" descr="Resultado de imagen de python png"/>
+          <p:cNvPicPr>
+            <a:picLocks noChangeAspect="1" noChangeArrowheads="1"/>
+          </p:cNvPicPr>
+          <p:nvPr/>
+        </p:nvPicPr>
+        <p:blipFill>
+          <a:blip r:embed="rId4" cstate="print">
+            <a:extLst>
+              <a:ext uri="{28A0092B-C50C-407E-A947-70E740481C1C}">
+                <a14:useLocalDpi xmlns:a14="http://schemas.microsoft.com/office/drawing/2010/main" val="0"/>
+              </a:ext>
+            </a:extLst>
+          </a:blip>
+          <a:srcRect/>
+          <a:stretch>
+            <a:fillRect/>
+          </a:stretch>
+        </p:blipFill>
+        <p:spPr bwMode="auto">
+          <a:xfrm>
+            <a:off x="7743107" y="1254363"/>
+            <a:ext cx="2579304" cy="2574826"/>
+          </a:xfrm>
+          <a:prstGeom prst="rect">
+            <a:avLst/>
+          </a:prstGeom>
+          <a:noFill/>
+          <a:extLst>
+            <a:ext uri="{909E8E84-426E-40DD-AFC4-6F175D3DCCD1}">
+              <a14:hiddenFill xmlns:a14="http://schemas.microsoft.com/office/drawing/2010/main">
+                <a:solidFill>
+                  <a:srgbClr val="FFFFFF"/>
+                </a:solidFill>
+              </a14:hiddenFill>
+            </a:ext>
+          </a:extLst>
+        </p:spPr>
+      </p:pic>
+      <p:pic>
+        <p:nvPicPr>
+          <p:cNvPr id="1028" name="Picture 4" descr="Resultado de imagen de github png"/>
+          <p:cNvPicPr>
+            <a:picLocks noChangeAspect="1" noChangeArrowheads="1"/>
+          </p:cNvPicPr>
+          <p:nvPr/>
+        </p:nvPicPr>
+        <p:blipFill>
+          <a:blip r:embed="rId5" cstate="print">
+            <a:extLst>
+              <a:ext uri="{28A0092B-C50C-407E-A947-70E740481C1C}">
+                <a14:useLocalDpi xmlns:a14="http://schemas.microsoft.com/office/drawing/2010/main" val="0"/>
+              </a:ext>
+            </a:extLst>
+          </a:blip>
+          <a:srcRect/>
+          <a:stretch>
+            <a:fillRect/>
+          </a:stretch>
+        </p:blipFill>
+        <p:spPr bwMode="auto">
+          <a:xfrm>
+            <a:off x="8040817" y="4307074"/>
+            <a:ext cx="1983884" cy="1938451"/>
+          </a:xfrm>
+          <a:prstGeom prst="rect">
+            <a:avLst/>
+          </a:prstGeom>
+          <a:noFill/>
+          <a:extLst>
+            <a:ext uri="{909E8E84-426E-40DD-AFC4-6F175D3DCCD1}">
+              <a14:hiddenFill xmlns:a14="http://schemas.microsoft.com/office/drawing/2010/main">
+                <a:solidFill>
+                  <a:srgbClr val="FFFFFF"/>
+                </a:solidFill>
+              </a14:hiddenFill>
+            </a:ext>
+          </a:extLst>
+        </p:spPr>
+      </p:pic>
+      <p:cxnSp>
+        <p:nvCxnSpPr>
+          <p:cNvPr id="8" name="Conector recto 7"/>
+          <p:cNvCxnSpPr/>
+          <p:nvPr/>
+        </p:nvCxnSpPr>
+        <p:spPr>
+          <a:xfrm>
+            <a:off x="1071053" y="4019453"/>
+            <a:ext cx="9729219" cy="0"/>
+          </a:xfrm>
+          <a:prstGeom prst="line">
+            <a:avLst/>
+          </a:prstGeom>
+          <a:ln w="25400"/>
+        </p:spPr>
+        <p:style>
+          <a:lnRef idx="1">
+            <a:schemeClr val="dk1"/>
+          </a:lnRef>
+          <a:fillRef idx="0">
+            <a:schemeClr val="dk1"/>
+          </a:fillRef>
+          <a:effectRef idx="0">
+            <a:schemeClr val="dk1"/>
+          </a:effectRef>
+          <a:fontRef idx="minor">
+            <a:schemeClr val="tx1"/>
+          </a:fontRef>
+        </p:style>
+      </p:cxnSp>
+      <p:cxnSp>
+        <p:nvCxnSpPr>
+          <p:cNvPr id="10" name="Conector recto 9"/>
+          <p:cNvCxnSpPr/>
+          <p:nvPr/>
+        </p:nvCxnSpPr>
+        <p:spPr>
+          <a:xfrm>
+            <a:off x="6771736" y="1153774"/>
+            <a:ext cx="77638" cy="5091751"/>
+          </a:xfrm>
+          <a:prstGeom prst="line">
+            <a:avLst/>
+          </a:prstGeom>
+          <a:ln w="25400"/>
+        </p:spPr>
+        <p:style>
+          <a:lnRef idx="1">
+            <a:schemeClr val="dk1"/>
+          </a:lnRef>
+          <a:fillRef idx="0">
+            <a:schemeClr val="dk1"/>
+          </a:fillRef>
+          <a:effectRef idx="0">
+            <a:schemeClr val="dk1"/>
+          </a:effectRef>
+          <a:fontRef idx="minor">
+            <a:schemeClr val="tx1"/>
+          </a:fontRef>
+        </p:style>
+      </p:cxnSp>
+      <p:sp>
+        <p:nvSpPr>
+          <p:cNvPr id="11" name="CuadroTexto 10"/>
+          <p:cNvSpPr txBox="1"/>
+          <p:nvPr/>
+        </p:nvSpPr>
+        <p:spPr>
+          <a:xfrm>
+            <a:off x="3687074" y="6242650"/>
+            <a:ext cx="3162300" cy="369332"/>
+          </a:xfrm>
+          <a:prstGeom prst="rect">
+            <a:avLst/>
+          </a:prstGeom>
+          <a:noFill/>
+        </p:spPr>
+        <p:txBody>
+          <a:bodyPr wrap="square" rtlCol="0">
+            <a:spAutoFit/>
+          </a:bodyPr>
+          <a:lstStyle/>
+          <a:p>
+            <a:r>
+              <a:rPr lang="es-ES" b="1" dirty="0" smtClean="0"/>
+              <a:t>MACHINE LEARNING</a:t>
+            </a:r>
+            <a:endParaRPr lang="es-ES" b="1" dirty="0"/>
+          </a:p>
+        </p:txBody>
+      </p:sp>
     </p:spTree>
     <p:extLst>
       <p:ext uri="{BB962C8B-B14F-4D97-AF65-F5344CB8AC3E}">
@@ -12538,302 +12671,6 @@
                                         </p:tav>
                                       </p:tavLst>
                                     </p:anim>
-                                  </p:childTnLst>
-                                </p:cTn>
-                              </p:par>
-                            </p:childTnLst>
-                          </p:cTn>
-                        </p:par>
-                      </p:childTnLst>
-                    </p:cTn>
-                  </p:par>
-                  <p:par>
-                    <p:cTn id="9" fill="hold">
-                      <p:stCondLst>
-                        <p:cond delay="indefinite"/>
-                      </p:stCondLst>
-                      <p:childTnLst>
-                        <p:par>
-                          <p:cTn id="10" fill="hold">
-                            <p:stCondLst>
-                              <p:cond delay="0"/>
-                            </p:stCondLst>
-                            <p:childTnLst>
-                              <p:par>
-                                <p:cTn id="11" presetID="26" presetClass="entr" presetSubtype="0" fill="hold" nodeType="clickEffect">
-                                  <p:stCondLst>
-                                    <p:cond delay="0"/>
-                                  </p:stCondLst>
-                                  <p:childTnLst>
-                                    <p:set>
-                                      <p:cBhvr>
-                                        <p:cTn id="12" dur="1" fill="hold">
-                                          <p:stCondLst>
-                                            <p:cond delay="0"/>
-                                          </p:stCondLst>
-                                        </p:cTn>
-                                        <p:tgtEl>
-                                          <p:spTgt spid="2060"/>
-                                        </p:tgtEl>
-                                        <p:attrNameLst>
-                                          <p:attrName>style.visibility</p:attrName>
-                                        </p:attrNameLst>
-                                      </p:cBhvr>
-                                      <p:to>
-                                        <p:strVal val="visible"/>
-                                      </p:to>
-                                    </p:set>
-                                    <p:animEffect transition="in" filter="wipe(down)">
-                                      <p:cBhvr>
-                                        <p:cTn id="13" dur="580">
-                                          <p:stCondLst>
-                                            <p:cond delay="0"/>
-                                          </p:stCondLst>
-                                        </p:cTn>
-                                        <p:tgtEl>
-                                          <p:spTgt spid="2060"/>
-                                        </p:tgtEl>
-                                      </p:cBhvr>
-                                    </p:animEffect>
-                                    <p:anim calcmode="lin" valueType="num">
-                                      <p:cBhvr>
-                                        <p:cTn id="14" dur="1822" tmFilter="0,0; 0.14,0.36; 0.43,0.73; 0.71,0.91; 1.0,1.0">
-                                          <p:stCondLst>
-                                            <p:cond delay="0"/>
-                                          </p:stCondLst>
-                                        </p:cTn>
-                                        <p:tgtEl>
-                                          <p:spTgt spid="2060"/>
-                                        </p:tgtEl>
-                                        <p:attrNameLst>
-                                          <p:attrName>ppt_x</p:attrName>
-                                        </p:attrNameLst>
-                                      </p:cBhvr>
-                                      <p:tavLst>
-                                        <p:tav tm="0">
-                                          <p:val>
-                                            <p:strVal val="#ppt_x-0.25"/>
-                                          </p:val>
-                                        </p:tav>
-                                        <p:tav tm="100000">
-                                          <p:val>
-                                            <p:strVal val="#ppt_x"/>
-                                          </p:val>
-                                        </p:tav>
-                                      </p:tavLst>
-                                    </p:anim>
-                                    <p:anim calcmode="lin" valueType="num">
-                                      <p:cBhvr>
-                                        <p:cTn id="15" dur="664" tmFilter="0.0,0.0; 0.25,0.07; 0.50,0.2; 0.75,0.467; 1.0,1.0">
-                                          <p:stCondLst>
-                                            <p:cond delay="0"/>
-                                          </p:stCondLst>
-                                        </p:cTn>
-                                        <p:tgtEl>
-                                          <p:spTgt spid="2060"/>
-                                        </p:tgtEl>
-                                        <p:attrNameLst>
-                                          <p:attrName>ppt_y</p:attrName>
-                                        </p:attrNameLst>
-                                      </p:cBhvr>
-                                      <p:tavLst>
-                                        <p:tav tm="0" fmla="#ppt_y-sin(pi*$)/3">
-                                          <p:val>
-                                            <p:fltVal val="0.5"/>
-                                          </p:val>
-                                        </p:tav>
-                                        <p:tav tm="100000">
-                                          <p:val>
-                                            <p:fltVal val="1"/>
-                                          </p:val>
-                                        </p:tav>
-                                      </p:tavLst>
-                                    </p:anim>
-                                    <p:anim calcmode="lin" valueType="num">
-                                      <p:cBhvr>
-                                        <p:cTn id="16" dur="664" tmFilter="0, 0; 0.125,0.2665; 0.25,0.4; 0.375,0.465; 0.5,0.5;  0.625,0.535; 0.75,0.6; 0.875,0.7335; 1,1">
-                                          <p:stCondLst>
-                                            <p:cond delay="664"/>
-                                          </p:stCondLst>
-                                        </p:cTn>
-                                        <p:tgtEl>
-                                          <p:spTgt spid="2060"/>
-                                        </p:tgtEl>
-                                        <p:attrNameLst>
-                                          <p:attrName>ppt_y</p:attrName>
-                                        </p:attrNameLst>
-                                      </p:cBhvr>
-                                      <p:tavLst>
-                                        <p:tav tm="0" fmla="#ppt_y-sin(pi*$)/9">
-                                          <p:val>
-                                            <p:fltVal val="0"/>
-                                          </p:val>
-                                        </p:tav>
-                                        <p:tav tm="100000">
-                                          <p:val>
-                                            <p:fltVal val="1"/>
-                                          </p:val>
-                                        </p:tav>
-                                      </p:tavLst>
-                                    </p:anim>
-                                    <p:anim calcmode="lin" valueType="num">
-                                      <p:cBhvr>
-                                        <p:cTn id="17" dur="332" tmFilter="0, 0; 0.125,0.2665; 0.25,0.4; 0.375,0.465; 0.5,0.5;  0.625,0.535; 0.75,0.6; 0.875,0.7335; 1,1">
-                                          <p:stCondLst>
-                                            <p:cond delay="1324"/>
-                                          </p:stCondLst>
-                                        </p:cTn>
-                                        <p:tgtEl>
-                                          <p:spTgt spid="2060"/>
-                                        </p:tgtEl>
-                                        <p:attrNameLst>
-                                          <p:attrName>ppt_y</p:attrName>
-                                        </p:attrNameLst>
-                                      </p:cBhvr>
-                                      <p:tavLst>
-                                        <p:tav tm="0" fmla="#ppt_y-sin(pi*$)/27">
-                                          <p:val>
-                                            <p:fltVal val="0"/>
-                                          </p:val>
-                                        </p:tav>
-                                        <p:tav tm="100000">
-                                          <p:val>
-                                            <p:fltVal val="1"/>
-                                          </p:val>
-                                        </p:tav>
-                                      </p:tavLst>
-                                    </p:anim>
-                                    <p:anim calcmode="lin" valueType="num">
-                                      <p:cBhvr>
-                                        <p:cTn id="18" dur="164" tmFilter="0, 0; 0.125,0.2665; 0.25,0.4; 0.375,0.465; 0.5,0.5;  0.625,0.535; 0.75,0.6; 0.875,0.7335; 1,1">
-                                          <p:stCondLst>
-                                            <p:cond delay="1656"/>
-                                          </p:stCondLst>
-                                        </p:cTn>
-                                        <p:tgtEl>
-                                          <p:spTgt spid="2060"/>
-                                        </p:tgtEl>
-                                        <p:attrNameLst>
-                                          <p:attrName>ppt_y</p:attrName>
-                                        </p:attrNameLst>
-                                      </p:cBhvr>
-                                      <p:tavLst>
-                                        <p:tav tm="0" fmla="#ppt_y-sin(pi*$)/81">
-                                          <p:val>
-                                            <p:fltVal val="0"/>
-                                          </p:val>
-                                        </p:tav>
-                                        <p:tav tm="100000">
-                                          <p:val>
-                                            <p:fltVal val="1"/>
-                                          </p:val>
-                                        </p:tav>
-                                      </p:tavLst>
-                                    </p:anim>
-                                    <p:animScale>
-                                      <p:cBhvr>
-                                        <p:cTn id="19" dur="26">
-                                          <p:stCondLst>
-                                            <p:cond delay="650"/>
-                                          </p:stCondLst>
-                                        </p:cTn>
-                                        <p:tgtEl>
-                                          <p:spTgt spid="2060"/>
-                                        </p:tgtEl>
-                                      </p:cBhvr>
-                                      <p:to x="100000" y="60000"/>
-                                    </p:animScale>
-                                    <p:animScale>
-                                      <p:cBhvr>
-                                        <p:cTn id="20" dur="166" decel="50000">
-                                          <p:stCondLst>
-                                            <p:cond delay="676"/>
-                                          </p:stCondLst>
-                                        </p:cTn>
-                                        <p:tgtEl>
-                                          <p:spTgt spid="2060"/>
-                                        </p:tgtEl>
-                                      </p:cBhvr>
-                                      <p:to x="100000" y="100000"/>
-                                    </p:animScale>
-                                    <p:animScale>
-                                      <p:cBhvr>
-                                        <p:cTn id="21" dur="26">
-                                          <p:stCondLst>
-                                            <p:cond delay="1312"/>
-                                          </p:stCondLst>
-                                        </p:cTn>
-                                        <p:tgtEl>
-                                          <p:spTgt spid="2060"/>
-                                        </p:tgtEl>
-                                      </p:cBhvr>
-                                      <p:to x="100000" y="80000"/>
-                                    </p:animScale>
-                                    <p:animScale>
-                                      <p:cBhvr>
-                                        <p:cTn id="22" dur="166" decel="50000">
-                                          <p:stCondLst>
-                                            <p:cond delay="1338"/>
-                                          </p:stCondLst>
-                                        </p:cTn>
-                                        <p:tgtEl>
-                                          <p:spTgt spid="2060"/>
-                                        </p:tgtEl>
-                                      </p:cBhvr>
-                                      <p:to x="100000" y="100000"/>
-                                    </p:animScale>
-                                    <p:animScale>
-                                      <p:cBhvr>
-                                        <p:cTn id="23" dur="26">
-                                          <p:stCondLst>
-                                            <p:cond delay="1642"/>
-                                          </p:stCondLst>
-                                        </p:cTn>
-                                        <p:tgtEl>
-                                          <p:spTgt spid="2060"/>
-                                        </p:tgtEl>
-                                      </p:cBhvr>
-                                      <p:to x="100000" y="90000"/>
-                                    </p:animScale>
-                                    <p:animScale>
-                                      <p:cBhvr>
-                                        <p:cTn id="24" dur="166" decel="50000">
-                                          <p:stCondLst>
-                                            <p:cond delay="1668"/>
-                                          </p:stCondLst>
-                                        </p:cTn>
-                                        <p:tgtEl>
-                                          <p:spTgt spid="2060"/>
-                                        </p:tgtEl>
-                                      </p:cBhvr>
-                                      <p:to x="100000" y="100000"/>
-                                    </p:animScale>
-                                    <p:animScale>
-                                      <p:cBhvr>
-                                        <p:cTn id="25" dur="26">
-                                          <p:stCondLst>
-                                            <p:cond delay="1808"/>
-                                          </p:stCondLst>
-                                        </p:cTn>
-                                        <p:tgtEl>
-                                          <p:spTgt spid="2060"/>
-                                        </p:tgtEl>
-                                      </p:cBhvr>
-                                      <p:to x="100000" y="95000"/>
-                                    </p:animScale>
-                                    <p:animScale>
-                                      <p:cBhvr>
-                                        <p:cTn id="26" dur="166" decel="50000">
-                                          <p:stCondLst>
-                                            <p:cond delay="1834"/>
-                                          </p:stCondLst>
-                                        </p:cTn>
-                                        <p:tgtEl>
-                                          <p:spTgt spid="2060"/>
-                                        </p:tgtEl>
-                                      </p:cBhvr>
-                                      <p:to x="100000" y="100000"/>
-                                    </p:animScale>
                                   </p:childTnLst>
                                 </p:cTn>
                               </p:par>

</xml_diff>